<commit_message>
Updated design pattern materials
added draft for design patterns
added factory method
</commit_message>
<xml_diff>
--- a/7 - Design Patterns/Design Patterns (new).pptx
+++ b/7 - Design Patterns/Design Patterns (new).pptx
@@ -5,11 +5,17 @@
     <p:sldMasterId id="2147483648" r:id="rId1"/>
   </p:sldMasterIdLst>
   <p:notesMasterIdLst>
-    <p:notesMasterId r:id="rId4"/>
+    <p:notesMasterId r:id="rId10"/>
   </p:notesMasterIdLst>
   <p:sldIdLst>
     <p:sldId id="257" r:id="rId2"/>
     <p:sldId id="363" r:id="rId3"/>
+    <p:sldId id="365" r:id="rId4"/>
+    <p:sldId id="366" r:id="rId5"/>
+    <p:sldId id="367" r:id="rId6"/>
+    <p:sldId id="368" r:id="rId7"/>
+    <p:sldId id="369" r:id="rId8"/>
+    <p:sldId id="370" r:id="rId9"/>
   </p:sldIdLst>
   <p:sldSz cx="12192000" cy="6858000"/>
   <p:notesSz cx="6858000" cy="9144000"/>
@@ -3557,7 +3563,7 @@
           <a:p>
             <a:fld id="{75A99358-0554-3345-871D-48A6BABEE3E1}" type="datetimeFigureOut">
               <a:rPr lang="en-US" smtClean="0"/>
-              <a:t>4/21/2025</a:t>
+              <a:t>5/4/2025</a:t>
             </a:fld>
             <a:endParaRPr lang="en-US"/>
           </a:p>
@@ -4000,7 +4006,7 @@
           <a:p>
             <a:fld id="{04BC266F-70C8-954B-9EC8-D842168CE9D2}" type="datetimeFigureOut">
               <a:rPr lang="en-US" smtClean="0"/>
-              <a:t>4/21/2025</a:t>
+              <a:t>5/4/2025</a:t>
             </a:fld>
             <a:endParaRPr lang="en-US"/>
           </a:p>
@@ -5950,7 +5956,7 @@
           <a:p>
             <a:fld id="{04BC266F-70C8-954B-9EC8-D842168CE9D2}" type="datetimeFigureOut">
               <a:rPr lang="en-US" smtClean="0"/>
-              <a:t>4/21/2025</a:t>
+              <a:t>5/4/2025</a:t>
             </a:fld>
             <a:endParaRPr lang="en-US"/>
           </a:p>
@@ -7608,7 +7614,7 @@
           <a:p>
             <a:fld id="{04BC266F-70C8-954B-9EC8-D842168CE9D2}" type="datetimeFigureOut">
               <a:rPr lang="en-US" smtClean="0"/>
-              <a:t>4/21/2025</a:t>
+              <a:t>5/4/2025</a:t>
             </a:fld>
             <a:endParaRPr lang="en-US"/>
           </a:p>
@@ -8053,7 +8059,7 @@
           <a:p>
             <a:fld id="{04BC266F-70C8-954B-9EC8-D842168CE9D2}" type="datetimeFigureOut">
               <a:rPr lang="en-US" smtClean="0"/>
-              <a:t>4/21/2025</a:t>
+              <a:t>5/4/2025</a:t>
             </a:fld>
             <a:endParaRPr lang="en-US"/>
           </a:p>
@@ -9723,7 +9729,7 @@
           <a:p>
             <a:fld id="{04BC266F-70C8-954B-9EC8-D842168CE9D2}" type="datetimeFigureOut">
               <a:rPr lang="en-US" smtClean="0"/>
-              <a:t>4/21/2025</a:t>
+              <a:t>5/4/2025</a:t>
             </a:fld>
             <a:endParaRPr lang="en-US"/>
           </a:p>
@@ -10337,6 +10343,1428 @@
     <p:extLst>
       <p:ext uri="{BB962C8B-B14F-4D97-AF65-F5344CB8AC3E}">
         <p14:creationId xmlns:p14="http://schemas.microsoft.com/office/powerpoint/2010/main" val="163249862"/>
+      </p:ext>
+    </p:extLst>
+  </p:cSld>
+  <p:clrMapOvr>
+    <a:masterClrMapping/>
+  </p:clrMapOvr>
+</p:sld>
+</file>
+
+<file path=ppt/slides/slide3.xml><?xml version="1.0" encoding="utf-8"?>
+<p:sld xmlns:a="http://schemas.openxmlformats.org/drawingml/2006/main" xmlns:r="http://schemas.openxmlformats.org/officeDocument/2006/relationships" xmlns:p="http://schemas.openxmlformats.org/presentationml/2006/main">
+  <p:cSld>
+    <p:spTree>
+      <p:nvGrpSpPr>
+        <p:cNvPr id="1" name=""/>
+        <p:cNvGrpSpPr/>
+        <p:nvPr/>
+      </p:nvGrpSpPr>
+      <p:grpSpPr>
+        <a:xfrm>
+          <a:off x="0" y="0"/>
+          <a:ext cx="0" cy="0"/>
+          <a:chOff x="0" y="0"/>
+          <a:chExt cx="0" cy="0"/>
+        </a:xfrm>
+      </p:grpSpPr>
+      <p:sp>
+        <p:nvSpPr>
+          <p:cNvPr id="2" name="Title 1">
+            <a:extLst>
+              <a:ext uri="{FF2B5EF4-FFF2-40B4-BE49-F238E27FC236}">
+                <a16:creationId xmlns:a16="http://schemas.microsoft.com/office/drawing/2014/main" id="{0587D3B1-7249-6B97-5971-3016157C9382}"/>
+              </a:ext>
+            </a:extLst>
+          </p:cNvPr>
+          <p:cNvSpPr>
+            <a:spLocks noGrp="1"/>
+          </p:cNvSpPr>
+          <p:nvPr>
+            <p:ph type="title"/>
+          </p:nvPr>
+        </p:nvSpPr>
+        <p:spPr/>
+        <p:txBody>
+          <a:bodyPr/>
+          <a:lstStyle/>
+          <a:p>
+            <a:r>
+              <a:rPr lang="en-US" sz="4400" b="1" i="0" dirty="0">
+                <a:solidFill>
+                  <a:srgbClr val="444444"/>
+                </a:solidFill>
+                <a:effectLst/>
+                <a:latin typeface="PTSans-Bold"/>
+              </a:rPr>
+              <a:t>Design patterns</a:t>
+            </a:r>
+            <a:endParaRPr lang="en-PH" dirty="0"/>
+          </a:p>
+        </p:txBody>
+      </p:sp>
+      <p:sp>
+        <p:nvSpPr>
+          <p:cNvPr id="3" name="Content Placeholder 2">
+            <a:extLst>
+              <a:ext uri="{FF2B5EF4-FFF2-40B4-BE49-F238E27FC236}">
+                <a16:creationId xmlns:a16="http://schemas.microsoft.com/office/drawing/2014/main" id="{83A52987-D3CC-AEC3-ABB8-420BCE8DAE26}"/>
+              </a:ext>
+            </a:extLst>
+          </p:cNvPr>
+          <p:cNvSpPr>
+            <a:spLocks noGrp="1"/>
+          </p:cNvSpPr>
+          <p:nvPr>
+            <p:ph idx="1"/>
+          </p:nvPr>
+        </p:nvSpPr>
+        <p:spPr/>
+        <p:txBody>
+          <a:bodyPr>
+            <a:normAutofit fontScale="62500" lnSpcReduction="20000"/>
+          </a:bodyPr>
+          <a:lstStyle/>
+          <a:p>
+            <a:r>
+              <a:rPr lang="en-US" sz="2800" b="1" i="0" dirty="0">
+                <a:solidFill>
+                  <a:srgbClr val="444444"/>
+                </a:solidFill>
+                <a:effectLst/>
+                <a:latin typeface="PTSans-Bold"/>
+              </a:rPr>
+              <a:t>Design patterns </a:t>
+            </a:r>
+            <a:r>
+              <a:rPr lang="en-US" dirty="0"/>
+              <a:t>are typical solutions to commonly occurring</a:t>
+            </a:r>
+            <a:br>
+              <a:rPr lang="en-US" dirty="0"/>
+            </a:br>
+            <a:r>
+              <a:rPr lang="en-US" dirty="0"/>
+              <a:t>problems in software design. They are like pre-made blueprints that you can customize to solve a recurring design problem in your code.</a:t>
+            </a:r>
+          </a:p>
+          <a:p>
+            <a:r>
+              <a:rPr lang="en-US" dirty="0"/>
+              <a:t>You can’t just find a pattern and copy it into your program,</a:t>
+            </a:r>
+            <a:br>
+              <a:rPr lang="en-US" dirty="0"/>
+            </a:br>
+            <a:r>
+              <a:rPr lang="en-US" dirty="0"/>
+              <a:t>the way you can with off-the-shelf functions or libraries. The</a:t>
+            </a:r>
+            <a:br>
+              <a:rPr lang="en-US" dirty="0"/>
+            </a:br>
+            <a:r>
+              <a:rPr lang="en-US" dirty="0"/>
+              <a:t>pattern is not a specific piece of code, but a general concept</a:t>
+            </a:r>
+            <a:br>
+              <a:rPr lang="en-US" dirty="0"/>
+            </a:br>
+            <a:r>
+              <a:rPr lang="en-US" dirty="0"/>
+              <a:t>for solving a particular problem. You can follow the pattern</a:t>
+            </a:r>
+            <a:br>
+              <a:rPr lang="en-US" dirty="0"/>
+            </a:br>
+            <a:r>
+              <a:rPr lang="en-US" dirty="0"/>
+              <a:t>details and implement a solution that suits the realities of your</a:t>
+            </a:r>
+            <a:br>
+              <a:rPr lang="en-US" dirty="0"/>
+            </a:br>
+            <a:r>
+              <a:rPr lang="en-US" dirty="0"/>
+              <a:t>own program.</a:t>
+            </a:r>
+          </a:p>
+          <a:p>
+            <a:r>
+              <a:rPr lang="en-US" dirty="0"/>
+              <a:t>Patterns are often confused with algorithms, because both</a:t>
+            </a:r>
+            <a:br>
+              <a:rPr lang="en-US" dirty="0"/>
+            </a:br>
+            <a:r>
+              <a:rPr lang="en-US" dirty="0"/>
+              <a:t>concepts describe typical solutions to some known problems.</a:t>
+            </a:r>
+            <a:br>
+              <a:rPr lang="en-US" dirty="0"/>
+            </a:br>
+            <a:r>
+              <a:rPr lang="en-US" dirty="0"/>
+              <a:t>While an algorithm always defines a clear set of actions that</a:t>
+            </a:r>
+            <a:br>
+              <a:rPr lang="en-US" dirty="0"/>
+            </a:br>
+            <a:r>
+              <a:rPr lang="en-US" dirty="0"/>
+              <a:t>can achieve some goal, a pattern is a more high-level description of a solution. The code of the same pattern applied to two</a:t>
+            </a:r>
+            <a:br>
+              <a:rPr lang="en-US" dirty="0"/>
+            </a:br>
+            <a:r>
+              <a:rPr lang="en-US" dirty="0"/>
+              <a:t>different programs may be different.</a:t>
+            </a:r>
+          </a:p>
+          <a:p>
+            <a:r>
+              <a:rPr lang="en-US" dirty="0"/>
+              <a:t>An analogy to an algorithm is a cooking recipe: both have clear</a:t>
+            </a:r>
+            <a:br>
+              <a:rPr lang="en-US" dirty="0"/>
+            </a:br>
+            <a:r>
+              <a:rPr lang="en-US" dirty="0"/>
+              <a:t>steps to achieve a goal. On the other hand, a pattern is more</a:t>
+            </a:r>
+            <a:br>
+              <a:rPr lang="en-US" dirty="0"/>
+            </a:br>
+            <a:r>
+              <a:rPr lang="en-US" dirty="0"/>
+              <a:t>like a blueprint: you can see what the result and its features</a:t>
+            </a:r>
+            <a:br>
+              <a:rPr lang="en-US" dirty="0"/>
+            </a:br>
+            <a:r>
+              <a:rPr lang="en-US" dirty="0"/>
+              <a:t>are, but the exact order of implementation is up to you. </a:t>
+            </a:r>
+            <a:br>
+              <a:rPr lang="en-US" dirty="0"/>
+            </a:br>
+            <a:endParaRPr lang="en-PH" dirty="0"/>
+          </a:p>
+        </p:txBody>
+      </p:sp>
+    </p:spTree>
+    <p:extLst>
+      <p:ext uri="{BB962C8B-B14F-4D97-AF65-F5344CB8AC3E}">
+        <p14:creationId xmlns:p14="http://schemas.microsoft.com/office/powerpoint/2010/main" val="3813102048"/>
+      </p:ext>
+    </p:extLst>
+  </p:cSld>
+  <p:clrMapOvr>
+    <a:masterClrMapping/>
+  </p:clrMapOvr>
+</p:sld>
+</file>
+
+<file path=ppt/slides/slide4.xml><?xml version="1.0" encoding="utf-8"?>
+<p:sld xmlns:a="http://schemas.openxmlformats.org/drawingml/2006/main" xmlns:r="http://schemas.openxmlformats.org/officeDocument/2006/relationships" xmlns:p="http://schemas.openxmlformats.org/presentationml/2006/main">
+  <p:cSld>
+    <p:spTree>
+      <p:nvGrpSpPr>
+        <p:cNvPr id="1" name="">
+          <a:extLst>
+            <a:ext uri="{FF2B5EF4-FFF2-40B4-BE49-F238E27FC236}">
+              <a16:creationId xmlns:a16="http://schemas.microsoft.com/office/drawing/2014/main" id="{5A46A3DD-47A7-F9FE-7218-F5E1647B9AF9}"/>
+            </a:ext>
+          </a:extLst>
+        </p:cNvPr>
+        <p:cNvGrpSpPr/>
+        <p:nvPr/>
+      </p:nvGrpSpPr>
+      <p:grpSpPr>
+        <a:xfrm>
+          <a:off x="0" y="0"/>
+          <a:ext cx="0" cy="0"/>
+          <a:chOff x="0" y="0"/>
+          <a:chExt cx="0" cy="0"/>
+        </a:xfrm>
+      </p:grpSpPr>
+      <p:sp>
+        <p:nvSpPr>
+          <p:cNvPr id="2" name="Title 1">
+            <a:extLst>
+              <a:ext uri="{FF2B5EF4-FFF2-40B4-BE49-F238E27FC236}">
+                <a16:creationId xmlns:a16="http://schemas.microsoft.com/office/drawing/2014/main" id="{D3C37CC1-B777-D61A-F4B7-47D8E161B472}"/>
+              </a:ext>
+            </a:extLst>
+          </p:cNvPr>
+          <p:cNvSpPr>
+            <a:spLocks noGrp="1"/>
+          </p:cNvSpPr>
+          <p:nvPr>
+            <p:ph type="title"/>
+          </p:nvPr>
+        </p:nvSpPr>
+        <p:spPr/>
+        <p:txBody>
+          <a:bodyPr/>
+          <a:lstStyle/>
+          <a:p>
+            <a:r>
+              <a:rPr lang="en-US" sz="4400" b="1" i="0" dirty="0">
+                <a:solidFill>
+                  <a:srgbClr val="444444"/>
+                </a:solidFill>
+                <a:effectLst/>
+                <a:latin typeface="PTSans-Bold"/>
+              </a:rPr>
+              <a:t>Types of Design patterns</a:t>
+            </a:r>
+            <a:endParaRPr lang="en-PH" dirty="0"/>
+          </a:p>
+        </p:txBody>
+      </p:sp>
+      <p:sp>
+        <p:nvSpPr>
+          <p:cNvPr id="3" name="Content Placeholder 2">
+            <a:extLst>
+              <a:ext uri="{FF2B5EF4-FFF2-40B4-BE49-F238E27FC236}">
+                <a16:creationId xmlns:a16="http://schemas.microsoft.com/office/drawing/2014/main" id="{2F610033-8B17-480B-519F-A8B8C1FD821E}"/>
+              </a:ext>
+            </a:extLst>
+          </p:cNvPr>
+          <p:cNvSpPr>
+            <a:spLocks noGrp="1"/>
+          </p:cNvSpPr>
+          <p:nvPr>
+            <p:ph idx="1"/>
+          </p:nvPr>
+        </p:nvSpPr>
+        <p:spPr/>
+        <p:txBody>
+          <a:bodyPr>
+            <a:normAutofit/>
+          </a:bodyPr>
+          <a:lstStyle/>
+          <a:p>
+            <a:r>
+              <a:rPr lang="en-US" sz="1800" b="1" i="0" dirty="0">
+                <a:solidFill>
+                  <a:srgbClr val="444444"/>
+                </a:solidFill>
+                <a:effectLst/>
+                <a:latin typeface="PTSans-Bold"/>
+              </a:rPr>
+              <a:t>Creational patterns </a:t>
+            </a:r>
+            <a:r>
+              <a:rPr lang="en-US" sz="1800" b="0" i="0" dirty="0">
+                <a:solidFill>
+                  <a:srgbClr val="444444"/>
+                </a:solidFill>
+                <a:effectLst/>
+                <a:latin typeface="PTSans-Regular"/>
+              </a:rPr>
+              <a:t>provide object creation mechanisms that</a:t>
+            </a:r>
+            <a:br>
+              <a:rPr lang="en-US" sz="1800" b="0" i="0" dirty="0">
+                <a:solidFill>
+                  <a:srgbClr val="444444"/>
+                </a:solidFill>
+                <a:effectLst/>
+                <a:latin typeface="PTSans-Regular"/>
+              </a:rPr>
+            </a:br>
+            <a:r>
+              <a:rPr lang="en-US" sz="1800" b="0" i="0" dirty="0">
+                <a:solidFill>
+                  <a:srgbClr val="444444"/>
+                </a:solidFill>
+                <a:effectLst/>
+                <a:latin typeface="PTSans-Regular"/>
+              </a:rPr>
+              <a:t>increase flexibility and reuse of existing code.</a:t>
+            </a:r>
+          </a:p>
+          <a:p>
+            <a:endParaRPr lang="en-US" sz="1800" dirty="0">
+              <a:solidFill>
+                <a:srgbClr val="444444"/>
+              </a:solidFill>
+              <a:latin typeface="PTSans-Regular"/>
+            </a:endParaRPr>
+          </a:p>
+          <a:p>
+            <a:r>
+              <a:rPr lang="en-US" sz="1800" b="1" i="0" dirty="0">
+                <a:solidFill>
+                  <a:srgbClr val="444444"/>
+                </a:solidFill>
+                <a:effectLst/>
+                <a:latin typeface="PTSans-Bold"/>
+              </a:rPr>
+              <a:t>Structural patterns </a:t>
+            </a:r>
+            <a:r>
+              <a:rPr lang="en-US" sz="1800" b="0" i="0" dirty="0">
+                <a:solidFill>
+                  <a:srgbClr val="444444"/>
+                </a:solidFill>
+                <a:effectLst/>
+                <a:latin typeface="PTSans-Regular"/>
+              </a:rPr>
+              <a:t>explain how to assemble objects and classes into larger structures, while keeping the structures flexible</a:t>
+            </a:r>
+            <a:br>
+              <a:rPr lang="en-US" sz="1800" b="0" i="0" dirty="0">
+                <a:solidFill>
+                  <a:srgbClr val="444444"/>
+                </a:solidFill>
+                <a:effectLst/>
+                <a:latin typeface="PTSans-Regular"/>
+              </a:rPr>
+            </a:br>
+            <a:r>
+              <a:rPr lang="en-US" sz="1800" b="0" i="0" dirty="0">
+                <a:solidFill>
+                  <a:srgbClr val="444444"/>
+                </a:solidFill>
+                <a:effectLst/>
+                <a:latin typeface="PTSans-Regular"/>
+              </a:rPr>
+              <a:t>and efficient.</a:t>
+            </a:r>
+            <a:endParaRPr lang="en-US" sz="1800" dirty="0">
+              <a:solidFill>
+                <a:srgbClr val="444444"/>
+              </a:solidFill>
+              <a:latin typeface="PTSans-Regular"/>
+            </a:endParaRPr>
+          </a:p>
+          <a:p>
+            <a:endParaRPr lang="en-US" sz="1800" b="1" i="0" dirty="0">
+              <a:solidFill>
+                <a:srgbClr val="444444"/>
+              </a:solidFill>
+              <a:effectLst/>
+              <a:latin typeface="PTSans-Regular"/>
+            </a:endParaRPr>
+          </a:p>
+          <a:p>
+            <a:r>
+              <a:rPr lang="en-US" sz="1800" b="1" i="0" dirty="0">
+                <a:solidFill>
+                  <a:srgbClr val="444444"/>
+                </a:solidFill>
+                <a:effectLst/>
+                <a:latin typeface="PTSans-Bold"/>
+              </a:rPr>
+              <a:t>Behavioral patterns </a:t>
+            </a:r>
+            <a:r>
+              <a:rPr lang="en-US" sz="1800" b="0" i="0" dirty="0">
+                <a:solidFill>
+                  <a:srgbClr val="444444"/>
+                </a:solidFill>
+                <a:effectLst/>
+                <a:latin typeface="PTSans-Regular"/>
+              </a:rPr>
+              <a:t>take care of effective communication and</a:t>
+            </a:r>
+            <a:br>
+              <a:rPr lang="en-US" sz="1800" b="0" i="0" dirty="0">
+                <a:solidFill>
+                  <a:srgbClr val="444444"/>
+                </a:solidFill>
+                <a:effectLst/>
+                <a:latin typeface="PTSans-Regular"/>
+              </a:rPr>
+            </a:br>
+            <a:r>
+              <a:rPr lang="en-US" sz="1800" b="0" i="0" dirty="0">
+                <a:solidFill>
+                  <a:srgbClr val="444444"/>
+                </a:solidFill>
+                <a:effectLst/>
+                <a:latin typeface="PTSans-Regular"/>
+              </a:rPr>
+              <a:t>the assignment of responsibilities between objects</a:t>
+            </a:r>
+            <a:r>
+              <a:rPr lang="en-US" dirty="0"/>
+              <a:t> </a:t>
+            </a:r>
+            <a:br>
+              <a:rPr lang="en-US" dirty="0"/>
+            </a:br>
+            <a:endParaRPr lang="en-PH" dirty="0"/>
+          </a:p>
+        </p:txBody>
+      </p:sp>
+    </p:spTree>
+    <p:extLst>
+      <p:ext uri="{BB962C8B-B14F-4D97-AF65-F5344CB8AC3E}">
+        <p14:creationId xmlns:p14="http://schemas.microsoft.com/office/powerpoint/2010/main" val="1210312635"/>
+      </p:ext>
+    </p:extLst>
+  </p:cSld>
+  <p:clrMapOvr>
+    <a:masterClrMapping/>
+  </p:clrMapOvr>
+</p:sld>
+</file>
+
+<file path=ppt/slides/slide5.xml><?xml version="1.0" encoding="utf-8"?>
+<p:sld xmlns:a="http://schemas.openxmlformats.org/drawingml/2006/main" xmlns:r="http://schemas.openxmlformats.org/officeDocument/2006/relationships" xmlns:p="http://schemas.openxmlformats.org/presentationml/2006/main">
+  <p:cSld>
+    <p:spTree>
+      <p:nvGrpSpPr>
+        <p:cNvPr id="1" name=""/>
+        <p:cNvGrpSpPr/>
+        <p:nvPr/>
+      </p:nvGrpSpPr>
+      <p:grpSpPr>
+        <a:xfrm>
+          <a:off x="0" y="0"/>
+          <a:ext cx="0" cy="0"/>
+          <a:chOff x="0" y="0"/>
+          <a:chExt cx="0" cy="0"/>
+        </a:xfrm>
+      </p:grpSpPr>
+      <p:sp>
+        <p:nvSpPr>
+          <p:cNvPr id="2" name="Title 1">
+            <a:extLst>
+              <a:ext uri="{FF2B5EF4-FFF2-40B4-BE49-F238E27FC236}">
+                <a16:creationId xmlns:a16="http://schemas.microsoft.com/office/drawing/2014/main" id="{B726F9B7-AC69-5236-20C7-8D291D8A3DF0}"/>
+              </a:ext>
+            </a:extLst>
+          </p:cNvPr>
+          <p:cNvSpPr>
+            <a:spLocks noGrp="1"/>
+          </p:cNvSpPr>
+          <p:nvPr>
+            <p:ph type="title"/>
+          </p:nvPr>
+        </p:nvSpPr>
+        <p:spPr/>
+        <p:txBody>
+          <a:bodyPr/>
+          <a:lstStyle/>
+          <a:p>
+            <a:r>
+              <a:rPr lang="en-PH" dirty="0"/>
+              <a:t>Who invented patterns?</a:t>
+            </a:r>
+          </a:p>
+        </p:txBody>
+      </p:sp>
+      <p:sp>
+        <p:nvSpPr>
+          <p:cNvPr id="3" name="Content Placeholder 2">
+            <a:extLst>
+              <a:ext uri="{FF2B5EF4-FFF2-40B4-BE49-F238E27FC236}">
+                <a16:creationId xmlns:a16="http://schemas.microsoft.com/office/drawing/2014/main" id="{75A8513A-5F2A-7912-9E47-B28BA490D468}"/>
+              </a:ext>
+            </a:extLst>
+          </p:cNvPr>
+          <p:cNvSpPr>
+            <a:spLocks noGrp="1"/>
+          </p:cNvSpPr>
+          <p:nvPr>
+            <p:ph idx="1"/>
+          </p:nvPr>
+        </p:nvSpPr>
+        <p:spPr/>
+        <p:txBody>
+          <a:bodyPr/>
+          <a:lstStyle/>
+          <a:p>
+            <a:r>
+              <a:rPr lang="en-US" sz="1800" b="0" i="0" dirty="0">
+                <a:solidFill>
+                  <a:srgbClr val="444444"/>
+                </a:solidFill>
+                <a:effectLst/>
+                <a:latin typeface="PTSans-Regular"/>
+              </a:rPr>
+              <a:t>That’s a good, but not a very accurate, question. Design patterns aren’t obscure, sophisticated concepts—quite the opposite. Patterns are typical solutions to common problems in</a:t>
+            </a:r>
+            <a:br>
+              <a:rPr lang="en-US" sz="1800" b="0" i="0" dirty="0">
+                <a:solidFill>
+                  <a:srgbClr val="444444"/>
+                </a:solidFill>
+                <a:effectLst/>
+                <a:latin typeface="PTSans-Regular"/>
+              </a:rPr>
+            </a:br>
+            <a:r>
+              <a:rPr lang="en-US" sz="1800" b="0" i="0" dirty="0">
+                <a:solidFill>
+                  <a:srgbClr val="444444"/>
+                </a:solidFill>
+                <a:effectLst/>
+                <a:latin typeface="PTSans-Regular"/>
+              </a:rPr>
+              <a:t>object-oriented design. When a solution gets repeated over</a:t>
+            </a:r>
+            <a:br>
+              <a:rPr lang="en-US" sz="1800" b="0" i="0" dirty="0">
+                <a:solidFill>
+                  <a:srgbClr val="444444"/>
+                </a:solidFill>
+                <a:effectLst/>
+                <a:latin typeface="PTSans-Regular"/>
+              </a:rPr>
+            </a:br>
+            <a:r>
+              <a:rPr lang="en-US" sz="1800" b="0" i="0" dirty="0">
+                <a:solidFill>
+                  <a:srgbClr val="444444"/>
+                </a:solidFill>
+                <a:effectLst/>
+                <a:latin typeface="PTSans-Regular"/>
+              </a:rPr>
+              <a:t>and over in various projects, someone eventually puts a name</a:t>
+            </a:r>
+            <a:br>
+              <a:rPr lang="en-US" sz="1800" b="0" i="0" dirty="0">
+                <a:solidFill>
+                  <a:srgbClr val="444444"/>
+                </a:solidFill>
+                <a:effectLst/>
+                <a:latin typeface="PTSans-Regular"/>
+              </a:rPr>
+            </a:br>
+            <a:r>
+              <a:rPr lang="en-US" sz="1800" b="0" i="0" dirty="0">
+                <a:solidFill>
+                  <a:srgbClr val="444444"/>
+                </a:solidFill>
+                <a:effectLst/>
+                <a:latin typeface="fontawesome"/>
+              </a:rPr>
+              <a:t></a:t>
+            </a:r>
+            <a:br>
+              <a:rPr lang="en-US" sz="1800" b="0" i="0" dirty="0">
+                <a:solidFill>
+                  <a:srgbClr val="444444"/>
+                </a:solidFill>
+                <a:effectLst/>
+                <a:latin typeface="fontawesome"/>
+              </a:rPr>
+            </a:br>
+            <a:r>
+              <a:rPr lang="en-US" sz="1800" b="0" i="0" dirty="0">
+                <a:solidFill>
+                  <a:srgbClr val="CCCCCC"/>
+                </a:solidFill>
+                <a:effectLst/>
+                <a:latin typeface="PTSans-Regular"/>
+              </a:rPr>
+              <a:t>26 Introduction to Design Patterns / What’s a Design Pattern?</a:t>
+            </a:r>
+            <a:br>
+              <a:rPr lang="en-US" dirty="0"/>
+            </a:br>
+            <a:r>
+              <a:rPr lang="en-US" sz="1800" b="0" i="0" dirty="0">
+                <a:solidFill>
+                  <a:srgbClr val="444444"/>
+                </a:solidFill>
+                <a:effectLst/>
+                <a:latin typeface="PTSans-Regular"/>
+              </a:rPr>
+              <a:t>to it and describes the solution in detail. That’s basically how</a:t>
+            </a:r>
+            <a:br>
+              <a:rPr lang="en-US" sz="1800" b="0" i="0" dirty="0">
+                <a:solidFill>
+                  <a:srgbClr val="444444"/>
+                </a:solidFill>
+                <a:effectLst/>
+                <a:latin typeface="PTSans-Regular"/>
+              </a:rPr>
+            </a:br>
+            <a:r>
+              <a:rPr lang="en-US" sz="1800" b="0" i="0" dirty="0">
+                <a:solidFill>
+                  <a:srgbClr val="444444"/>
+                </a:solidFill>
+                <a:effectLst/>
+                <a:latin typeface="PTSans-Regular"/>
+              </a:rPr>
+              <a:t>a pattern gets discovered</a:t>
+            </a:r>
+            <a:r>
+              <a:rPr lang="en-US" dirty="0"/>
+              <a:t> </a:t>
+            </a:r>
+            <a:br>
+              <a:rPr lang="en-US" dirty="0"/>
+            </a:br>
+            <a:endParaRPr lang="en-PH" dirty="0"/>
+          </a:p>
+        </p:txBody>
+      </p:sp>
+    </p:spTree>
+    <p:extLst>
+      <p:ext uri="{BB962C8B-B14F-4D97-AF65-F5344CB8AC3E}">
+        <p14:creationId xmlns:p14="http://schemas.microsoft.com/office/powerpoint/2010/main" val="300246254"/>
+      </p:ext>
+    </p:extLst>
+  </p:cSld>
+  <p:clrMapOvr>
+    <a:masterClrMapping/>
+  </p:clrMapOvr>
+</p:sld>
+</file>
+
+<file path=ppt/slides/slide6.xml><?xml version="1.0" encoding="utf-8"?>
+<p:sld xmlns:a="http://schemas.openxmlformats.org/drawingml/2006/main" xmlns:r="http://schemas.openxmlformats.org/officeDocument/2006/relationships" xmlns:p="http://schemas.openxmlformats.org/presentationml/2006/main">
+  <p:cSld>
+    <p:spTree>
+      <p:nvGrpSpPr>
+        <p:cNvPr id="1" name=""/>
+        <p:cNvGrpSpPr/>
+        <p:nvPr/>
+      </p:nvGrpSpPr>
+      <p:grpSpPr>
+        <a:xfrm>
+          <a:off x="0" y="0"/>
+          <a:ext cx="0" cy="0"/>
+          <a:chOff x="0" y="0"/>
+          <a:chExt cx="0" cy="0"/>
+        </a:xfrm>
+      </p:grpSpPr>
+      <p:sp>
+        <p:nvSpPr>
+          <p:cNvPr id="2" name="Title 1">
+            <a:extLst>
+              <a:ext uri="{FF2B5EF4-FFF2-40B4-BE49-F238E27FC236}">
+                <a16:creationId xmlns:a16="http://schemas.microsoft.com/office/drawing/2014/main" id="{6E3B476E-4925-BAAA-A673-F3CC808194E1}"/>
+              </a:ext>
+            </a:extLst>
+          </p:cNvPr>
+          <p:cNvSpPr>
+            <a:spLocks noGrp="1"/>
+          </p:cNvSpPr>
+          <p:nvPr>
+            <p:ph type="title"/>
+          </p:nvPr>
+        </p:nvSpPr>
+        <p:spPr/>
+        <p:txBody>
+          <a:bodyPr/>
+          <a:lstStyle/>
+          <a:p>
+            <a:r>
+              <a:rPr lang="en-PH" dirty="0"/>
+              <a:t>Why should I learn patterns?</a:t>
+            </a:r>
+          </a:p>
+        </p:txBody>
+      </p:sp>
+      <p:sp>
+        <p:nvSpPr>
+          <p:cNvPr id="3" name="Content Placeholder 2">
+            <a:extLst>
+              <a:ext uri="{FF2B5EF4-FFF2-40B4-BE49-F238E27FC236}">
+                <a16:creationId xmlns:a16="http://schemas.microsoft.com/office/drawing/2014/main" id="{2BC54DD1-2950-0DA1-796B-951A7B657502}"/>
+              </a:ext>
+            </a:extLst>
+          </p:cNvPr>
+          <p:cNvSpPr>
+            <a:spLocks noGrp="1"/>
+          </p:cNvSpPr>
+          <p:nvPr>
+            <p:ph idx="1"/>
+          </p:nvPr>
+        </p:nvSpPr>
+        <p:spPr/>
+        <p:txBody>
+          <a:bodyPr>
+            <a:normAutofit lnSpcReduction="10000"/>
+          </a:bodyPr>
+          <a:lstStyle/>
+          <a:p>
+            <a:r>
+              <a:rPr lang="en-US" sz="1800" b="0" i="0" dirty="0">
+                <a:solidFill>
+                  <a:srgbClr val="444444"/>
+                </a:solidFill>
+                <a:effectLst/>
+                <a:latin typeface="PTSans-Regular"/>
+              </a:rPr>
+              <a:t>The truth is that you might manage to work as a programmer</a:t>
+            </a:r>
+            <a:br>
+              <a:rPr lang="en-US" sz="1800" b="0" i="0" dirty="0">
+                <a:solidFill>
+                  <a:srgbClr val="444444"/>
+                </a:solidFill>
+                <a:effectLst/>
+                <a:latin typeface="PTSans-Regular"/>
+              </a:rPr>
+            </a:br>
+            <a:r>
+              <a:rPr lang="en-US" sz="1800" b="0" i="0" dirty="0">
+                <a:solidFill>
+                  <a:srgbClr val="444444"/>
+                </a:solidFill>
+                <a:effectLst/>
+                <a:latin typeface="PTSans-Regular"/>
+              </a:rPr>
+              <a:t>for many years without knowing about a single pattern. A lot</a:t>
+            </a:r>
+            <a:br>
+              <a:rPr lang="en-US" sz="1800" b="0" i="0" dirty="0">
+                <a:solidFill>
+                  <a:srgbClr val="444444"/>
+                </a:solidFill>
+                <a:effectLst/>
+                <a:latin typeface="PTSans-Regular"/>
+              </a:rPr>
+            </a:br>
+            <a:r>
+              <a:rPr lang="en-US" sz="1800" b="0" i="0" dirty="0">
+                <a:solidFill>
+                  <a:srgbClr val="444444"/>
+                </a:solidFill>
+                <a:effectLst/>
+                <a:latin typeface="PTSans-Regular"/>
+              </a:rPr>
+              <a:t>of people do just that. Even in that case, though, you might be</a:t>
+            </a:r>
+            <a:br>
+              <a:rPr lang="en-US" sz="1800" b="0" i="0" dirty="0">
+                <a:solidFill>
+                  <a:srgbClr val="444444"/>
+                </a:solidFill>
+                <a:effectLst/>
+                <a:latin typeface="PTSans-Regular"/>
+              </a:rPr>
+            </a:br>
+            <a:r>
+              <a:rPr lang="en-US" sz="1800" b="0" i="0" dirty="0">
+                <a:solidFill>
+                  <a:srgbClr val="444444"/>
+                </a:solidFill>
+                <a:effectLst/>
+                <a:latin typeface="PTSans-Regular"/>
+              </a:rPr>
+              <a:t>implementing some patterns without even knowing it. So why</a:t>
+            </a:r>
+            <a:br>
+              <a:rPr lang="en-US" sz="1800" b="0" i="0" dirty="0">
+                <a:solidFill>
+                  <a:srgbClr val="444444"/>
+                </a:solidFill>
+                <a:effectLst/>
+                <a:latin typeface="PTSans-Regular"/>
+              </a:rPr>
+            </a:br>
+            <a:r>
+              <a:rPr lang="en-US" sz="1800" b="0" i="0" dirty="0">
+                <a:solidFill>
+                  <a:srgbClr val="444444"/>
+                </a:solidFill>
+                <a:effectLst/>
+                <a:latin typeface="PTSans-Regular"/>
+              </a:rPr>
+              <a:t>would you spend time learning them?</a:t>
+            </a:r>
+            <a:br>
+              <a:rPr lang="en-US" sz="1800" b="0" i="0" dirty="0">
+                <a:solidFill>
+                  <a:srgbClr val="444444"/>
+                </a:solidFill>
+                <a:effectLst/>
+                <a:latin typeface="PTSans-Regular"/>
+              </a:rPr>
+            </a:br>
+            <a:r>
+              <a:rPr lang="en-US" sz="1800" b="0" i="0" dirty="0">
+                <a:solidFill>
+                  <a:srgbClr val="444444"/>
+                </a:solidFill>
+                <a:effectLst/>
+                <a:latin typeface="PTSans-Regular"/>
+              </a:rPr>
+              <a:t>• Design patterns are a toolkit of </a:t>
+            </a:r>
+            <a:r>
+              <a:rPr lang="en-US" sz="1800" b="1" i="0" dirty="0">
+                <a:solidFill>
+                  <a:srgbClr val="444444"/>
+                </a:solidFill>
+                <a:effectLst/>
+                <a:latin typeface="PTSans-Bold"/>
+              </a:rPr>
+              <a:t>tried and tested solutions</a:t>
+            </a:r>
+            <a:br>
+              <a:rPr lang="en-US" sz="1800" b="1" i="0" dirty="0">
+                <a:solidFill>
+                  <a:srgbClr val="444444"/>
+                </a:solidFill>
+                <a:effectLst/>
+                <a:latin typeface="PTSans-Bold"/>
+              </a:rPr>
+            </a:br>
+            <a:r>
+              <a:rPr lang="en-US" sz="1800" b="0" i="0" dirty="0">
+                <a:solidFill>
+                  <a:srgbClr val="444444"/>
+                </a:solidFill>
+                <a:effectLst/>
+                <a:latin typeface="PTSans-Regular"/>
+              </a:rPr>
+              <a:t>to common problems in software design. Even if you never</a:t>
+            </a:r>
+            <a:br>
+              <a:rPr lang="en-US" sz="1800" b="0" i="0" dirty="0">
+                <a:solidFill>
+                  <a:srgbClr val="444444"/>
+                </a:solidFill>
+                <a:effectLst/>
+                <a:latin typeface="PTSans-Regular"/>
+              </a:rPr>
+            </a:br>
+            <a:r>
+              <a:rPr lang="en-US" sz="1800" b="0" i="0" dirty="0">
+                <a:solidFill>
+                  <a:srgbClr val="444444"/>
+                </a:solidFill>
+                <a:effectLst/>
+                <a:latin typeface="PTSans-Regular"/>
+              </a:rPr>
+              <a:t>encounter these problems, knowing patterns is still useful</a:t>
+            </a:r>
+            <a:br>
+              <a:rPr lang="en-US" sz="1800" b="0" i="0" dirty="0">
+                <a:solidFill>
+                  <a:srgbClr val="444444"/>
+                </a:solidFill>
+                <a:effectLst/>
+                <a:latin typeface="PTSans-Regular"/>
+              </a:rPr>
+            </a:br>
+            <a:r>
+              <a:rPr lang="en-US" sz="1800" b="0" i="0" dirty="0">
+                <a:solidFill>
+                  <a:srgbClr val="444444"/>
+                </a:solidFill>
+                <a:effectLst/>
+                <a:latin typeface="PTSans-Regular"/>
+              </a:rPr>
+              <a:t>because it teaches you how to solve all sorts of problems using</a:t>
+            </a:r>
+            <a:br>
+              <a:rPr lang="en-US" sz="1800" b="0" i="0" dirty="0">
+                <a:solidFill>
+                  <a:srgbClr val="444444"/>
+                </a:solidFill>
+                <a:effectLst/>
+                <a:latin typeface="PTSans-Regular"/>
+              </a:rPr>
+            </a:br>
+            <a:r>
+              <a:rPr lang="en-US" sz="1800" b="0" i="0" dirty="0">
+                <a:solidFill>
+                  <a:srgbClr val="444444"/>
+                </a:solidFill>
+                <a:effectLst/>
+                <a:latin typeface="PTSans-Regular"/>
+              </a:rPr>
+              <a:t>principles of object-oriented design.</a:t>
+            </a:r>
+            <a:br>
+              <a:rPr lang="en-US" sz="1800" b="0" i="0" dirty="0">
+                <a:solidFill>
+                  <a:srgbClr val="444444"/>
+                </a:solidFill>
+                <a:effectLst/>
+                <a:latin typeface="PTSans-Regular"/>
+              </a:rPr>
+            </a:br>
+            <a:r>
+              <a:rPr lang="en-US" sz="1800" b="0" i="0" dirty="0">
+                <a:solidFill>
+                  <a:srgbClr val="444444"/>
+                </a:solidFill>
+                <a:effectLst/>
+                <a:latin typeface="PTSans-Regular"/>
+              </a:rPr>
+              <a:t>• Design patterns define a common language that you and your</a:t>
+            </a:r>
+            <a:br>
+              <a:rPr lang="en-US" sz="1800" b="0" i="0" dirty="0">
+                <a:solidFill>
+                  <a:srgbClr val="444444"/>
+                </a:solidFill>
+                <a:effectLst/>
+                <a:latin typeface="PTSans-Regular"/>
+              </a:rPr>
+            </a:br>
+            <a:r>
+              <a:rPr lang="en-US" sz="1800" b="0" i="0" dirty="0">
+                <a:solidFill>
+                  <a:srgbClr val="444444"/>
+                </a:solidFill>
+                <a:effectLst/>
+                <a:latin typeface="PTSans-Regular"/>
+              </a:rPr>
+              <a:t>teammates can use to communicate more efficiently. You can</a:t>
+            </a:r>
+            <a:br>
+              <a:rPr lang="en-US" sz="1800" b="0" i="0" dirty="0">
+                <a:solidFill>
+                  <a:srgbClr val="444444"/>
+                </a:solidFill>
+                <a:effectLst/>
+                <a:latin typeface="PTSans-Regular"/>
+              </a:rPr>
+            </a:br>
+            <a:r>
+              <a:rPr lang="en-US" sz="1800" b="0" i="0" dirty="0">
+                <a:solidFill>
+                  <a:srgbClr val="444444"/>
+                </a:solidFill>
+                <a:effectLst/>
+                <a:latin typeface="PTSans-Regular"/>
+              </a:rPr>
+              <a:t>say, “Oh, just use a Singleton for that,” and everyone will</a:t>
+            </a:r>
+            <a:br>
+              <a:rPr lang="en-US" sz="1800" b="0" i="0" dirty="0">
+                <a:solidFill>
+                  <a:srgbClr val="444444"/>
+                </a:solidFill>
+                <a:effectLst/>
+                <a:latin typeface="PTSans-Regular"/>
+              </a:rPr>
+            </a:br>
+            <a:r>
+              <a:rPr lang="en-US" sz="1800" b="0" i="0" dirty="0">
+                <a:solidFill>
+                  <a:srgbClr val="444444"/>
+                </a:solidFill>
+                <a:effectLst/>
+                <a:latin typeface="PTSans-Regular"/>
+              </a:rPr>
+              <a:t>understand the idea behind your suggestion. No need to</a:t>
+            </a:r>
+            <a:br>
+              <a:rPr lang="en-US" sz="1800" b="0" i="0" dirty="0">
+                <a:solidFill>
+                  <a:srgbClr val="444444"/>
+                </a:solidFill>
+                <a:effectLst/>
+                <a:latin typeface="PTSans-Regular"/>
+              </a:rPr>
+            </a:br>
+            <a:r>
+              <a:rPr lang="en-US" sz="1800" b="0" i="0" dirty="0">
+                <a:solidFill>
+                  <a:srgbClr val="444444"/>
+                </a:solidFill>
+                <a:effectLst/>
+                <a:latin typeface="PTSans-Regular"/>
+              </a:rPr>
+              <a:t>explain what a singleton is if you know the pattern and</a:t>
+            </a:r>
+            <a:br>
+              <a:rPr lang="en-US" sz="1800" b="0" i="0" dirty="0">
+                <a:solidFill>
+                  <a:srgbClr val="444444"/>
+                </a:solidFill>
+                <a:effectLst/>
+                <a:latin typeface="PTSans-Regular"/>
+              </a:rPr>
+            </a:br>
+            <a:r>
+              <a:rPr lang="en-US" sz="1800" b="0" i="0" dirty="0">
+                <a:solidFill>
+                  <a:srgbClr val="444444"/>
+                </a:solidFill>
+                <a:effectLst/>
+                <a:latin typeface="PTSans-Regular"/>
+              </a:rPr>
+              <a:t>its name</a:t>
+            </a:r>
+            <a:r>
+              <a:rPr lang="en-US" dirty="0"/>
+              <a:t> </a:t>
+            </a:r>
+            <a:br>
+              <a:rPr lang="en-US" dirty="0"/>
+            </a:br>
+            <a:endParaRPr lang="en-PH" dirty="0"/>
+          </a:p>
+        </p:txBody>
+      </p:sp>
+    </p:spTree>
+    <p:extLst>
+      <p:ext uri="{BB962C8B-B14F-4D97-AF65-F5344CB8AC3E}">
+        <p14:creationId xmlns:p14="http://schemas.microsoft.com/office/powerpoint/2010/main" val="455503014"/>
+      </p:ext>
+    </p:extLst>
+  </p:cSld>
+  <p:clrMapOvr>
+    <a:masterClrMapping/>
+  </p:clrMapOvr>
+</p:sld>
+</file>
+
+<file path=ppt/slides/slide7.xml><?xml version="1.0" encoding="utf-8"?>
+<p:sld xmlns:a="http://schemas.openxmlformats.org/drawingml/2006/main" xmlns:r="http://schemas.openxmlformats.org/officeDocument/2006/relationships" xmlns:p="http://schemas.openxmlformats.org/presentationml/2006/main">
+  <p:cSld>
+    <p:spTree>
+      <p:nvGrpSpPr>
+        <p:cNvPr id="1" name=""/>
+        <p:cNvGrpSpPr/>
+        <p:nvPr/>
+      </p:nvGrpSpPr>
+      <p:grpSpPr>
+        <a:xfrm>
+          <a:off x="0" y="0"/>
+          <a:ext cx="0" cy="0"/>
+          <a:chOff x="0" y="0"/>
+          <a:chExt cx="0" cy="0"/>
+        </a:xfrm>
+      </p:grpSpPr>
+      <p:sp>
+        <p:nvSpPr>
+          <p:cNvPr id="2" name="Title 1">
+            <a:extLst>
+              <a:ext uri="{FF2B5EF4-FFF2-40B4-BE49-F238E27FC236}">
+                <a16:creationId xmlns:a16="http://schemas.microsoft.com/office/drawing/2014/main" id="{E0302AC1-F222-E44D-14D5-8A79FC6787EA}"/>
+              </a:ext>
+            </a:extLst>
+          </p:cNvPr>
+          <p:cNvSpPr>
+            <a:spLocks noGrp="1"/>
+          </p:cNvSpPr>
+          <p:nvPr>
+            <p:ph type="title"/>
+          </p:nvPr>
+        </p:nvSpPr>
+        <p:spPr/>
+        <p:txBody>
+          <a:bodyPr/>
+          <a:lstStyle/>
+          <a:p>
+            <a:r>
+              <a:rPr lang="en-PH" dirty="0"/>
+              <a:t>Factory Method</a:t>
+            </a:r>
+          </a:p>
+        </p:txBody>
+      </p:sp>
+      <p:sp>
+        <p:nvSpPr>
+          <p:cNvPr id="3" name="Content Placeholder 2">
+            <a:extLst>
+              <a:ext uri="{FF2B5EF4-FFF2-40B4-BE49-F238E27FC236}">
+                <a16:creationId xmlns:a16="http://schemas.microsoft.com/office/drawing/2014/main" id="{8225A62D-AD87-9AFC-B7D2-C4CF3141D890}"/>
+              </a:ext>
+            </a:extLst>
+          </p:cNvPr>
+          <p:cNvSpPr>
+            <a:spLocks noGrp="1"/>
+          </p:cNvSpPr>
+          <p:nvPr>
+            <p:ph idx="1"/>
+          </p:nvPr>
+        </p:nvSpPr>
+        <p:spPr/>
+        <p:txBody>
+          <a:bodyPr/>
+          <a:lstStyle/>
+          <a:p>
+            <a:r>
+              <a:rPr lang="en-US" sz="1800" b="1" i="0" dirty="0">
+                <a:solidFill>
+                  <a:srgbClr val="444444"/>
+                </a:solidFill>
+                <a:effectLst/>
+                <a:latin typeface="PTSans-Bold"/>
+              </a:rPr>
+              <a:t>Factory Method </a:t>
+            </a:r>
+            <a:r>
+              <a:rPr lang="en-US" sz="1800" b="0" i="0" dirty="0">
+                <a:solidFill>
+                  <a:srgbClr val="444444"/>
+                </a:solidFill>
+                <a:effectLst/>
+                <a:latin typeface="PTSans-Regular"/>
+              </a:rPr>
+              <a:t>is a creational design pattern that provides</a:t>
+            </a:r>
+            <a:br>
+              <a:rPr lang="en-US" sz="1800" b="0" i="0" dirty="0">
+                <a:solidFill>
+                  <a:srgbClr val="444444"/>
+                </a:solidFill>
+                <a:effectLst/>
+                <a:latin typeface="PTSans-Regular"/>
+              </a:rPr>
+            </a:br>
+            <a:r>
+              <a:rPr lang="en-US" sz="1800" b="0" i="0" dirty="0">
+                <a:solidFill>
+                  <a:srgbClr val="444444"/>
+                </a:solidFill>
+                <a:effectLst/>
+                <a:latin typeface="PTSans-Regular"/>
+              </a:rPr>
+              <a:t>an interface for creating objects in a superclass, but allows</a:t>
+            </a:r>
+            <a:br>
+              <a:rPr lang="en-US" sz="1800" b="0" i="0" dirty="0">
+                <a:solidFill>
+                  <a:srgbClr val="444444"/>
+                </a:solidFill>
+                <a:effectLst/>
+                <a:latin typeface="PTSans-Regular"/>
+              </a:rPr>
+            </a:br>
+            <a:r>
+              <a:rPr lang="en-US" sz="1800" b="0" i="0" dirty="0">
+                <a:solidFill>
+                  <a:srgbClr val="444444"/>
+                </a:solidFill>
+                <a:effectLst/>
+                <a:latin typeface="PTSans-Regular"/>
+              </a:rPr>
+              <a:t>subclasses to alter the type of objects that will be created.</a:t>
+            </a:r>
+            <a:r>
+              <a:rPr lang="en-US" dirty="0"/>
+              <a:t> </a:t>
+            </a:r>
+            <a:br>
+              <a:rPr lang="en-US" dirty="0"/>
+            </a:br>
+            <a:endParaRPr lang="en-PH" dirty="0"/>
+          </a:p>
+        </p:txBody>
+      </p:sp>
+    </p:spTree>
+    <p:extLst>
+      <p:ext uri="{BB962C8B-B14F-4D97-AF65-F5344CB8AC3E}">
+        <p14:creationId xmlns:p14="http://schemas.microsoft.com/office/powerpoint/2010/main" val="4151783376"/>
+      </p:ext>
+    </p:extLst>
+  </p:cSld>
+  <p:clrMapOvr>
+    <a:masterClrMapping/>
+  </p:clrMapOvr>
+</p:sld>
+</file>
+
+<file path=ppt/slides/slide8.xml><?xml version="1.0" encoding="utf-8"?>
+<p:sld xmlns:a="http://schemas.openxmlformats.org/drawingml/2006/main" xmlns:r="http://schemas.openxmlformats.org/officeDocument/2006/relationships" xmlns:p="http://schemas.openxmlformats.org/presentationml/2006/main">
+  <p:cSld>
+    <p:spTree>
+      <p:nvGrpSpPr>
+        <p:cNvPr id="1" name="">
+          <a:extLst>
+            <a:ext uri="{FF2B5EF4-FFF2-40B4-BE49-F238E27FC236}">
+              <a16:creationId xmlns:a16="http://schemas.microsoft.com/office/drawing/2014/main" id="{8E6550AB-9BB4-88AB-8E8E-0A4F18F11A42}"/>
+            </a:ext>
+          </a:extLst>
+        </p:cNvPr>
+        <p:cNvGrpSpPr/>
+        <p:nvPr/>
+      </p:nvGrpSpPr>
+      <p:grpSpPr>
+        <a:xfrm>
+          <a:off x="0" y="0"/>
+          <a:ext cx="0" cy="0"/>
+          <a:chOff x="0" y="0"/>
+          <a:chExt cx="0" cy="0"/>
+        </a:xfrm>
+      </p:grpSpPr>
+      <p:sp>
+        <p:nvSpPr>
+          <p:cNvPr id="2" name="Title 1">
+            <a:extLst>
+              <a:ext uri="{FF2B5EF4-FFF2-40B4-BE49-F238E27FC236}">
+                <a16:creationId xmlns:a16="http://schemas.microsoft.com/office/drawing/2014/main" id="{FCEA2404-C6C1-546F-5AF0-E61F50C308ED}"/>
+              </a:ext>
+            </a:extLst>
+          </p:cNvPr>
+          <p:cNvSpPr>
+            <a:spLocks noGrp="1"/>
+          </p:cNvSpPr>
+          <p:nvPr>
+            <p:ph type="title"/>
+          </p:nvPr>
+        </p:nvSpPr>
+        <p:spPr/>
+        <p:txBody>
+          <a:bodyPr/>
+          <a:lstStyle/>
+          <a:p>
+            <a:r>
+              <a:rPr lang="en-PH" dirty="0"/>
+              <a:t>Components of a Factory Method</a:t>
+            </a:r>
+          </a:p>
+        </p:txBody>
+      </p:sp>
+      <p:sp>
+        <p:nvSpPr>
+          <p:cNvPr id="3" name="Content Placeholder 2">
+            <a:extLst>
+              <a:ext uri="{FF2B5EF4-FFF2-40B4-BE49-F238E27FC236}">
+                <a16:creationId xmlns:a16="http://schemas.microsoft.com/office/drawing/2014/main" id="{4FBAD0BE-5218-1752-60D2-EE124B382384}"/>
+              </a:ext>
+            </a:extLst>
+          </p:cNvPr>
+          <p:cNvSpPr>
+            <a:spLocks noGrp="1"/>
+          </p:cNvSpPr>
+          <p:nvPr>
+            <p:ph idx="1"/>
+          </p:nvPr>
+        </p:nvSpPr>
+        <p:spPr/>
+        <p:txBody>
+          <a:bodyPr/>
+          <a:lstStyle/>
+          <a:p>
+            <a:pPr algn="l" fontAlgn="base">
+              <a:spcAft>
+                <a:spcPts val="1800"/>
+              </a:spcAft>
+              <a:buFont typeface="Arial" panose="020B0604020202020204" pitchFamily="34" charset="0"/>
+              <a:buChar char="•"/>
+            </a:pPr>
+            <a:r>
+              <a:rPr lang="en-US" sz="1200" b="1" i="0" dirty="0">
+                <a:solidFill>
+                  <a:srgbClr val="273239"/>
+                </a:solidFill>
+                <a:effectLst/>
+                <a:latin typeface="Nunito" pitchFamily="2" charset="0"/>
+              </a:rPr>
+              <a:t>Creator</a:t>
+            </a:r>
+            <a:r>
+              <a:rPr lang="en-US" sz="1200" b="0" i="0" dirty="0">
+                <a:solidFill>
+                  <a:srgbClr val="273239"/>
+                </a:solidFill>
+                <a:effectLst/>
+                <a:latin typeface="Nunito" pitchFamily="2" charset="0"/>
+              </a:rPr>
+              <a:t>: This is an abstract class or an interface that declares the factory method. The creator typically contains a method that serves as a factory for creating objects. It may also contain other methods that work with the created objects.</a:t>
+            </a:r>
+          </a:p>
+          <a:p>
+            <a:pPr algn="l" fontAlgn="base">
+              <a:spcAft>
+                <a:spcPts val="1800"/>
+              </a:spcAft>
+              <a:buFont typeface="Arial" panose="020B0604020202020204" pitchFamily="34" charset="0"/>
+              <a:buChar char="•"/>
+            </a:pPr>
+            <a:r>
+              <a:rPr lang="en-US" sz="1200" b="1" i="0" dirty="0">
+                <a:solidFill>
+                  <a:srgbClr val="273239"/>
+                </a:solidFill>
+                <a:effectLst/>
+                <a:latin typeface="Nunito" pitchFamily="2" charset="0"/>
+              </a:rPr>
+              <a:t>Concrete Creator</a:t>
+            </a:r>
+            <a:r>
+              <a:rPr lang="en-US" sz="1200" b="0" i="0" dirty="0">
+                <a:solidFill>
+                  <a:srgbClr val="273239"/>
+                </a:solidFill>
+                <a:effectLst/>
+                <a:latin typeface="Nunito" pitchFamily="2" charset="0"/>
+              </a:rPr>
+              <a:t>: Concrete Creator classes are subclasses of the Creator that implement the factory method to create specific types of objects. Each Concrete Creator is responsible for creating a particular product.</a:t>
+            </a:r>
+          </a:p>
+          <a:p>
+            <a:pPr algn="l" fontAlgn="base">
+              <a:spcAft>
+                <a:spcPts val="1800"/>
+              </a:spcAft>
+              <a:buFont typeface="Arial" panose="020B0604020202020204" pitchFamily="34" charset="0"/>
+              <a:buChar char="•"/>
+            </a:pPr>
+            <a:r>
+              <a:rPr lang="en-US" sz="1200" b="1" i="0" dirty="0">
+                <a:solidFill>
+                  <a:srgbClr val="273239"/>
+                </a:solidFill>
+                <a:effectLst/>
+                <a:latin typeface="Nunito" pitchFamily="2" charset="0"/>
+              </a:rPr>
+              <a:t>Product</a:t>
+            </a:r>
+            <a:r>
+              <a:rPr lang="en-US" sz="1200" b="0" i="0" dirty="0">
+                <a:solidFill>
+                  <a:srgbClr val="273239"/>
+                </a:solidFill>
+                <a:effectLst/>
+                <a:latin typeface="Nunito" pitchFamily="2" charset="0"/>
+              </a:rPr>
+              <a:t>: This is the interface or abstract class for the objects that the factory method creates. The Product defines the common interface for all objects that the factory method can create.</a:t>
+            </a:r>
+          </a:p>
+          <a:p>
+            <a:pPr algn="l" fontAlgn="base">
+              <a:spcAft>
+                <a:spcPts val="1800"/>
+              </a:spcAft>
+              <a:buFont typeface="Arial" panose="020B0604020202020204" pitchFamily="34" charset="0"/>
+              <a:buChar char="•"/>
+            </a:pPr>
+            <a:r>
+              <a:rPr lang="en-US" sz="1200" b="1" i="0" dirty="0">
+                <a:solidFill>
+                  <a:srgbClr val="273239"/>
+                </a:solidFill>
+                <a:effectLst/>
+                <a:latin typeface="Nunito" pitchFamily="2" charset="0"/>
+              </a:rPr>
+              <a:t>Concrete Product</a:t>
+            </a:r>
+            <a:r>
+              <a:rPr lang="en-US" sz="1200" b="0" i="0" dirty="0">
+                <a:solidFill>
+                  <a:srgbClr val="273239"/>
+                </a:solidFill>
+                <a:effectLst/>
+                <a:latin typeface="Nunito" pitchFamily="2" charset="0"/>
+              </a:rPr>
+              <a:t>: Concrete Product classes are the actual objects that the factory method creates. Each Concrete Product class implements the Product interface or extends the Product abstract class.</a:t>
+            </a:r>
+          </a:p>
+        </p:txBody>
+      </p:sp>
+    </p:spTree>
+    <p:extLst>
+      <p:ext uri="{BB962C8B-B14F-4D97-AF65-F5344CB8AC3E}">
+        <p14:creationId xmlns:p14="http://schemas.microsoft.com/office/powerpoint/2010/main" val="239805373"/>
       </p:ext>
     </p:extLst>
   </p:cSld>

</xml_diff>